<commit_message>
NW final work push
</commit_message>
<xml_diff>
--- a/WORKING DRAFT 9.29.pptx
+++ b/WORKING DRAFT 9.29.pptx
@@ -190,6 +190,11 @@
               </a:ln>
               <a:effectLst/>
             </c:spPr>
+            <c:extLst>
+              <c:ext xmlns:c16="http://schemas.microsoft.com/office/drawing/2014/chart" uri="{C3380CC4-5D6E-409C-BE32-E72D297353CC}">
+                <c16:uniqueId val="{00000003-8AAE-42BC-9127-C38571F9C24B}"/>
+              </c:ext>
+            </c:extLst>
           </c:dPt>
           <c:cat>
             <c:strRef>
@@ -970,7 +975,7 @@
           <a:p>
             <a:fld id="{BF1BCF3E-7836-4589-A7B9-DE9463A0DEB7}" type="datetimeFigureOut">
               <a:rPr lang="en-US" smtClean="0"/>
-              <a:t>9/29/2020</a:t>
+              <a:t>10/1/2020</a:t>
             </a:fld>
             <a:endParaRPr lang="en-US"/>
           </a:p>
@@ -1140,7 +1145,7 @@
           <a:p>
             <a:fld id="{BF1BCF3E-7836-4589-A7B9-DE9463A0DEB7}" type="datetimeFigureOut">
               <a:rPr lang="en-US" smtClean="0"/>
-              <a:t>9/29/2020</a:t>
+              <a:t>10/1/2020</a:t>
             </a:fld>
             <a:endParaRPr lang="en-US"/>
           </a:p>
@@ -1320,7 +1325,7 @@
           <a:p>
             <a:fld id="{BF1BCF3E-7836-4589-A7B9-DE9463A0DEB7}" type="datetimeFigureOut">
               <a:rPr lang="en-US" smtClean="0"/>
-              <a:t>9/29/2020</a:t>
+              <a:t>10/1/2020</a:t>
             </a:fld>
             <a:endParaRPr lang="en-US"/>
           </a:p>
@@ -1490,7 +1495,7 @@
           <a:p>
             <a:fld id="{BF1BCF3E-7836-4589-A7B9-DE9463A0DEB7}" type="datetimeFigureOut">
               <a:rPr lang="en-US" smtClean="0"/>
-              <a:t>9/29/2020</a:t>
+              <a:t>10/1/2020</a:t>
             </a:fld>
             <a:endParaRPr lang="en-US"/>
           </a:p>
@@ -1734,7 +1739,7 @@
           <a:p>
             <a:fld id="{BF1BCF3E-7836-4589-A7B9-DE9463A0DEB7}" type="datetimeFigureOut">
               <a:rPr lang="en-US" smtClean="0"/>
-              <a:t>9/29/2020</a:t>
+              <a:t>10/1/2020</a:t>
             </a:fld>
             <a:endParaRPr lang="en-US"/>
           </a:p>
@@ -1966,7 +1971,7 @@
           <a:p>
             <a:fld id="{BF1BCF3E-7836-4589-A7B9-DE9463A0DEB7}" type="datetimeFigureOut">
               <a:rPr lang="en-US" smtClean="0"/>
-              <a:t>9/29/2020</a:t>
+              <a:t>10/1/2020</a:t>
             </a:fld>
             <a:endParaRPr lang="en-US"/>
           </a:p>
@@ -2333,7 +2338,7 @@
           <a:p>
             <a:fld id="{BF1BCF3E-7836-4589-A7B9-DE9463A0DEB7}" type="datetimeFigureOut">
               <a:rPr lang="en-US" smtClean="0"/>
-              <a:t>9/29/2020</a:t>
+              <a:t>10/1/2020</a:t>
             </a:fld>
             <a:endParaRPr lang="en-US"/>
           </a:p>
@@ -2451,7 +2456,7 @@
           <a:p>
             <a:fld id="{BF1BCF3E-7836-4589-A7B9-DE9463A0DEB7}" type="datetimeFigureOut">
               <a:rPr lang="en-US" smtClean="0"/>
-              <a:t>9/29/2020</a:t>
+              <a:t>10/1/2020</a:t>
             </a:fld>
             <a:endParaRPr lang="en-US"/>
           </a:p>
@@ -2546,7 +2551,7 @@
           <a:p>
             <a:fld id="{BF1BCF3E-7836-4589-A7B9-DE9463A0DEB7}" type="datetimeFigureOut">
               <a:rPr lang="en-US" smtClean="0"/>
-              <a:t>9/29/2020</a:t>
+              <a:t>10/1/2020</a:t>
             </a:fld>
             <a:endParaRPr lang="en-US"/>
           </a:p>
@@ -2823,7 +2828,7 @@
           <a:p>
             <a:fld id="{BF1BCF3E-7836-4589-A7B9-DE9463A0DEB7}" type="datetimeFigureOut">
               <a:rPr lang="en-US" smtClean="0"/>
-              <a:t>9/29/2020</a:t>
+              <a:t>10/1/2020</a:t>
             </a:fld>
             <a:endParaRPr lang="en-US"/>
           </a:p>
@@ -3080,7 +3085,7 @@
           <a:p>
             <a:fld id="{BF1BCF3E-7836-4589-A7B9-DE9463A0DEB7}" type="datetimeFigureOut">
               <a:rPr lang="en-US" smtClean="0"/>
-              <a:t>9/29/2020</a:t>
+              <a:t>10/1/2020</a:t>
             </a:fld>
             <a:endParaRPr lang="en-US"/>
           </a:p>
@@ -3293,7 +3298,7 @@
           <a:p>
             <a:fld id="{BF1BCF3E-7836-4589-A7B9-DE9463A0DEB7}" type="datetimeFigureOut">
               <a:rPr lang="en-US" smtClean="0"/>
-              <a:t>9/29/2020</a:t>
+              <a:t>10/1/2020</a:t>
             </a:fld>
             <a:endParaRPr lang="en-US"/>
           </a:p>

</xml_diff>